<commit_message>
Add link to Firebase walkthrough
</commit_message>
<xml_diff>
--- a/Deploying Blazor WebAssembly to GitHub Pages.pptx
+++ b/Deploying Blazor WebAssembly to GitHub Pages.pptx
@@ -213,7 +213,7 @@
           <a:p>
             <a:fld id="{7A66462D-8375-476B-A997-11C764AA740F}" type="datetimeFigureOut">
               <a:rPr lang="en-US" smtClean="0"/>
-              <a:t>12/15/2020</a:t>
+              <a:t>1/17/2021</a:t>
             </a:fld>
             <a:endParaRPr lang="en-US" dirty="0"/>
           </a:p>
@@ -2063,7 +2063,7 @@
           <a:p>
             <a:fld id="{2A4FA98C-1AC5-4994-8CEF-6126DCC40BFF}" type="datetime1">
               <a:rPr lang="en-US" smtClean="0"/>
-              <a:t>12/15/2020</a:t>
+              <a:t>1/17/2021</a:t>
             </a:fld>
             <a:endParaRPr lang="en-US" dirty="0"/>
           </a:p>
@@ -2265,7 +2265,7 @@
           <a:p>
             <a:fld id="{CF9A1C99-4184-45F0-9AA1-C697F85E623B}" type="datetime1">
               <a:rPr lang="en-US" smtClean="0"/>
-              <a:t>12/15/2020</a:t>
+              <a:t>1/17/2021</a:t>
             </a:fld>
             <a:endParaRPr lang="en-US" dirty="0"/>
           </a:p>
@@ -2477,7 +2477,7 @@
           <a:p>
             <a:fld id="{D1EC2A0B-BBCB-4B8B-9248-C859E21102C1}" type="datetime1">
               <a:rPr lang="en-US" smtClean="0"/>
-              <a:t>12/15/2020</a:t>
+              <a:t>1/17/2021</a:t>
             </a:fld>
             <a:endParaRPr lang="en-US" dirty="0"/>
           </a:p>
@@ -2679,7 +2679,7 @@
           <a:p>
             <a:fld id="{BED2CB5F-3D5A-4261-A2A7-FB9EA21A41BA}" type="datetime1">
               <a:rPr lang="en-US" smtClean="0"/>
-              <a:t>12/15/2020</a:t>
+              <a:t>1/17/2021</a:t>
             </a:fld>
             <a:endParaRPr lang="en-US" dirty="0"/>
           </a:p>
@@ -2958,7 +2958,7 @@
           <a:p>
             <a:fld id="{95D14C51-39EE-440C-83FB-1AD9E676741A}" type="datetime1">
               <a:rPr lang="en-US" smtClean="0"/>
-              <a:t>12/15/2020</a:t>
+              <a:t>1/17/2021</a:t>
             </a:fld>
             <a:endParaRPr lang="en-US" dirty="0"/>
           </a:p>
@@ -3227,7 +3227,7 @@
           <a:p>
             <a:fld id="{2878B5CC-C6DC-4AD3-82B3-E28A83EAB02B}" type="datetime1">
               <a:rPr lang="en-US" smtClean="0"/>
-              <a:t>12/15/2020</a:t>
+              <a:t>1/17/2021</a:t>
             </a:fld>
             <a:endParaRPr lang="en-US" dirty="0"/>
           </a:p>
@@ -3643,7 +3643,7 @@
           <a:p>
             <a:fld id="{15F30398-614A-48BF-B149-7E39CBB7FEEB}" type="datetime1">
               <a:rPr lang="en-US" smtClean="0"/>
-              <a:t>12/15/2020</a:t>
+              <a:t>1/17/2021</a:t>
             </a:fld>
             <a:endParaRPr lang="en-US" dirty="0"/>
           </a:p>
@@ -3788,7 +3788,7 @@
           <a:p>
             <a:fld id="{6999B1E3-E444-4102-8B7B-4548D0914EED}" type="datetime1">
               <a:rPr lang="en-US" smtClean="0"/>
-              <a:t>12/15/2020</a:t>
+              <a:t>1/17/2021</a:t>
             </a:fld>
             <a:endParaRPr lang="en-US" dirty="0"/>
           </a:p>
@@ -3905,7 +3905,7 @@
           <a:p>
             <a:fld id="{4F03F3BD-A6C1-47A3-B461-CF850BBDDC38}" type="datetime1">
               <a:rPr lang="en-US" smtClean="0"/>
-              <a:t>12/15/2020</a:t>
+              <a:t>1/17/2021</a:t>
             </a:fld>
             <a:endParaRPr lang="en-US" dirty="0"/>
           </a:p>
@@ -4220,7 +4220,7 @@
           <a:p>
             <a:fld id="{139E32C2-6228-4F0D-8345-6FCB6E698C1C}" type="datetime1">
               <a:rPr lang="en-US" smtClean="0"/>
-              <a:t>12/15/2020</a:t>
+              <a:t>1/17/2021</a:t>
             </a:fld>
             <a:endParaRPr lang="en-US" dirty="0"/>
           </a:p>
@@ -4512,7 +4512,7 @@
           <a:p>
             <a:fld id="{87E2A6D4-FBC3-4B7A-BBFD-0A4EFD8F579D}" type="datetime1">
               <a:rPr lang="en-US" smtClean="0"/>
-              <a:t>12/15/2020</a:t>
+              <a:t>1/17/2021</a:t>
             </a:fld>
             <a:endParaRPr lang="en-US" dirty="0"/>
           </a:p>
@@ -4757,7 +4757,7 @@
           <a:p>
             <a:fld id="{C55774C2-BE32-498D-96C4-73B84A15DCC4}" type="datetime1">
               <a:rPr lang="en-US" smtClean="0"/>
-              <a:t>12/15/2020</a:t>
+              <a:t>1/17/2021</a:t>
             </a:fld>
             <a:endParaRPr lang="en-US" dirty="0"/>
           </a:p>
@@ -7904,7 +7904,7 @@
         </p:spPr>
         <p:txBody>
           <a:bodyPr>
-            <a:normAutofit/>
+            <a:normAutofit lnSpcReduction="10000"/>
           </a:bodyPr>
           <a:lstStyle/>
           <a:p>
@@ -7979,6 +7979,42 @@
               </a:rPr>
               <a:t>Firebase Hosting</a:t>
             </a:r>
+            <a:br>
+              <a:rPr lang="en-US" dirty="0">
+                <a:solidFill>
+                  <a:srgbClr val="24292E"/>
+                </a:solidFill>
+                <a:latin typeface="-apple-system"/>
+              </a:rPr>
+            </a:br>
+            <a:r>
+              <a:rPr lang="en-US" dirty="0">
+                <a:solidFill>
+                  <a:srgbClr val="24292E"/>
+                </a:solidFill>
+                <a:latin typeface="-apple-system"/>
+              </a:rPr>
+              <a:t>(</a:t>
+            </a:r>
+            <a:r>
+              <a:rPr lang="en-US" dirty="0">
+                <a:solidFill>
+                  <a:srgbClr val="24292E"/>
+                </a:solidFill>
+                <a:latin typeface="-apple-system"/>
+                <a:hlinkClick r:id="rId3"/>
+              </a:rPr>
+              <a:t>Blazor WASM Walkthrough</a:t>
+            </a:r>
+            <a:r>
+              <a:rPr lang="en-US" dirty="0">
+                <a:solidFill>
+                  <a:srgbClr val="24292E"/>
+                </a:solidFill>
+                <a:latin typeface="-apple-system"/>
+              </a:rPr>
+              <a:t>)</a:t>
+            </a:r>
           </a:p>
           <a:p>
             <a:pPr>
@@ -8108,10 +8144,10 @@
           <p:nvPr/>
         </p:nvPicPr>
         <p:blipFill>
-          <a:blip r:embed="rId3">
+          <a:blip r:embed="rId4">
             <a:extLst>
               <a:ext uri="{96DAC541-7B7A-43D3-8B79-37D633B846F1}">
-                <asvg:svgBlip xmlns:asvg="http://schemas.microsoft.com/office/drawing/2016/SVG/main" r:embed="rId4"/>
+                <asvg:svgBlip xmlns:asvg="http://schemas.microsoft.com/office/drawing/2016/SVG/main" r:embed="rId5"/>
               </a:ext>
             </a:extLst>
           </a:blip>

</xml_diff>